<commit_message>
Need to be developed.
</commit_message>
<xml_diff>
--- a/presentation/SmartHomeSystem.pptx
+++ b/presentation/SmartHomeSystem.pptx
@@ -4,9 +4,13 @@
   <p:sldMasterIdLst>
     <p:sldMasterId id="2147483648" r:id="rId1"/>
   </p:sldMasterIdLst>
+  <p:notesMasterIdLst>
+    <p:notesMasterId r:id="rId5"/>
+  </p:notesMasterIdLst>
   <p:sldIdLst>
     <p:sldId id="256" r:id="rId2"/>
-    <p:sldId id="257" r:id="rId3"/>
+    <p:sldId id="258" r:id="rId3"/>
+    <p:sldId id="257" r:id="rId4"/>
   </p:sldIdLst>
   <p:sldSz cx="12192000" cy="6858000"/>
   <p:notesSz cx="6858000" cy="9144000"/>
@@ -113,6 +117,562 @@
 </p:presentation>
 </file>
 
+<file path=ppt/commentAuthors.xml><?xml version="1.0" encoding="utf-8"?>
+<p:cmAuthorLst xmlns:a="http://schemas.openxmlformats.org/drawingml/2006/main" xmlns:r="http://schemas.openxmlformats.org/officeDocument/2006/relationships" xmlns:p="http://schemas.openxmlformats.org/presentationml/2006/main">
+  <p:cmAuthor id="1" name="Даниил Рязанов" initials="ДР" lastIdx="5" clrIdx="0">
+    <p:extLst>
+      <p:ext uri="{19B8F6BF-5375-455C-9EA6-DF929625EA0E}">
+        <p15:presenceInfo xmlns:p15="http://schemas.microsoft.com/office/powerpoint/2012/main" userId="ffe94a66ca815bfb" providerId="Windows Live"/>
+      </p:ext>
+    </p:extLst>
+  </p:cmAuthor>
+</p:cmAuthorLst>
+</file>
+
+<file path=ppt/notesMasters/notesMaster1.xml><?xml version="1.0" encoding="utf-8"?>
+<p:notesMaster xmlns:a="http://schemas.openxmlformats.org/drawingml/2006/main" xmlns:r="http://schemas.openxmlformats.org/officeDocument/2006/relationships" xmlns:p="http://schemas.openxmlformats.org/presentationml/2006/main">
+  <p:cSld>
+    <p:bg>
+      <p:bgRef idx="1001">
+        <a:schemeClr val="bg1"/>
+      </p:bgRef>
+    </p:bg>
+    <p:spTree>
+      <p:nvGrpSpPr>
+        <p:cNvPr id="1" name=""/>
+        <p:cNvGrpSpPr/>
+        <p:nvPr/>
+      </p:nvGrpSpPr>
+      <p:grpSpPr>
+        <a:xfrm>
+          <a:off x="0" y="0"/>
+          <a:ext cx="0" cy="0"/>
+          <a:chOff x="0" y="0"/>
+          <a:chExt cx="0" cy="0"/>
+        </a:xfrm>
+      </p:grpSpPr>
+      <p:sp>
+        <p:nvSpPr>
+          <p:cNvPr id="2" name="Верхний колонтитул 1"/>
+          <p:cNvSpPr>
+            <a:spLocks noGrp="1"/>
+          </p:cNvSpPr>
+          <p:nvPr>
+            <p:ph type="hdr" sz="quarter"/>
+          </p:nvPr>
+        </p:nvSpPr>
+        <p:spPr>
+          <a:xfrm>
+            <a:off x="0" y="0"/>
+            <a:ext cx="2971800" cy="458788"/>
+          </a:xfrm>
+          <a:prstGeom prst="rect">
+            <a:avLst/>
+          </a:prstGeom>
+        </p:spPr>
+        <p:txBody>
+          <a:bodyPr vert="horz" lIns="91440" tIns="45720" rIns="91440" bIns="45720" rtlCol="0"/>
+          <a:lstStyle>
+            <a:lvl1pPr algn="l">
+              <a:defRPr sz="1200"/>
+            </a:lvl1pPr>
+          </a:lstStyle>
+          <a:p>
+            <a:endParaRPr lang="ru-RU"/>
+          </a:p>
+        </p:txBody>
+      </p:sp>
+      <p:sp>
+        <p:nvSpPr>
+          <p:cNvPr id="3" name="Дата 2"/>
+          <p:cNvSpPr>
+            <a:spLocks noGrp="1"/>
+          </p:cNvSpPr>
+          <p:nvPr>
+            <p:ph type="dt" idx="1"/>
+          </p:nvPr>
+        </p:nvSpPr>
+        <p:spPr>
+          <a:xfrm>
+            <a:off x="3884613" y="0"/>
+            <a:ext cx="2971800" cy="458788"/>
+          </a:xfrm>
+          <a:prstGeom prst="rect">
+            <a:avLst/>
+          </a:prstGeom>
+        </p:spPr>
+        <p:txBody>
+          <a:bodyPr vert="horz" lIns="91440" tIns="45720" rIns="91440" bIns="45720" rtlCol="0"/>
+          <a:lstStyle>
+            <a:lvl1pPr algn="r">
+              <a:defRPr sz="1200"/>
+            </a:lvl1pPr>
+          </a:lstStyle>
+          <a:p>
+            <a:fld id="{02CE1ACB-0C78-4B3C-B583-63F1615840A9}" type="datetimeFigureOut">
+              <a:rPr lang="ru-RU" smtClean="0"/>
+              <a:t>17.02.2024</a:t>
+            </a:fld>
+            <a:endParaRPr lang="ru-RU"/>
+          </a:p>
+        </p:txBody>
+      </p:sp>
+      <p:sp>
+        <p:nvSpPr>
+          <p:cNvPr id="4" name="Образ слайда 3"/>
+          <p:cNvSpPr>
+            <a:spLocks noGrp="1" noRot="1" noChangeAspect="1"/>
+          </p:cNvSpPr>
+          <p:nvPr>
+            <p:ph type="sldImg" idx="2"/>
+          </p:nvPr>
+        </p:nvSpPr>
+        <p:spPr>
+          <a:xfrm>
+            <a:off x="685800" y="1143000"/>
+            <a:ext cx="5486400" cy="3086100"/>
+          </a:xfrm>
+          <a:prstGeom prst="rect">
+            <a:avLst/>
+          </a:prstGeom>
+          <a:noFill/>
+          <a:ln w="12700">
+            <a:solidFill>
+              <a:prstClr val="black"/>
+            </a:solidFill>
+          </a:ln>
+        </p:spPr>
+        <p:txBody>
+          <a:bodyPr vert="horz" lIns="91440" tIns="45720" rIns="91440" bIns="45720" rtlCol="0" anchor="ctr"/>
+          <a:lstStyle/>
+          <a:p>
+            <a:endParaRPr lang="ru-RU"/>
+          </a:p>
+        </p:txBody>
+      </p:sp>
+      <p:sp>
+        <p:nvSpPr>
+          <p:cNvPr id="5" name="Заметки 4"/>
+          <p:cNvSpPr>
+            <a:spLocks noGrp="1"/>
+          </p:cNvSpPr>
+          <p:nvPr>
+            <p:ph type="body" sz="quarter" idx="3"/>
+          </p:nvPr>
+        </p:nvSpPr>
+        <p:spPr>
+          <a:xfrm>
+            <a:off x="685800" y="4400550"/>
+            <a:ext cx="5486400" cy="3600450"/>
+          </a:xfrm>
+          <a:prstGeom prst="rect">
+            <a:avLst/>
+          </a:prstGeom>
+        </p:spPr>
+        <p:txBody>
+          <a:bodyPr vert="horz" lIns="91440" tIns="45720" rIns="91440" bIns="45720" rtlCol="0"/>
+          <a:lstStyle/>
+          <a:p>
+            <a:pPr lvl="0"/>
+            <a:r>
+              <a:rPr lang="ru-RU"/>
+              <a:t>Образец текста</a:t>
+            </a:r>
+          </a:p>
+          <a:p>
+            <a:pPr lvl="1"/>
+            <a:r>
+              <a:rPr lang="ru-RU"/>
+              <a:t>Второй уровень</a:t>
+            </a:r>
+          </a:p>
+          <a:p>
+            <a:pPr lvl="2"/>
+            <a:r>
+              <a:rPr lang="ru-RU"/>
+              <a:t>Третий уровень</a:t>
+            </a:r>
+          </a:p>
+          <a:p>
+            <a:pPr lvl="3"/>
+            <a:r>
+              <a:rPr lang="ru-RU"/>
+              <a:t>Четвертый уровень</a:t>
+            </a:r>
+          </a:p>
+          <a:p>
+            <a:pPr lvl="4"/>
+            <a:r>
+              <a:rPr lang="ru-RU"/>
+              <a:t>Пятый уровень</a:t>
+            </a:r>
+          </a:p>
+        </p:txBody>
+      </p:sp>
+      <p:sp>
+        <p:nvSpPr>
+          <p:cNvPr id="6" name="Нижний колонтитул 5"/>
+          <p:cNvSpPr>
+            <a:spLocks noGrp="1"/>
+          </p:cNvSpPr>
+          <p:nvPr>
+            <p:ph type="ftr" sz="quarter" idx="4"/>
+          </p:nvPr>
+        </p:nvSpPr>
+        <p:spPr>
+          <a:xfrm>
+            <a:off x="0" y="8685213"/>
+            <a:ext cx="2971800" cy="458787"/>
+          </a:xfrm>
+          <a:prstGeom prst="rect">
+            <a:avLst/>
+          </a:prstGeom>
+        </p:spPr>
+        <p:txBody>
+          <a:bodyPr vert="horz" lIns="91440" tIns="45720" rIns="91440" bIns="45720" rtlCol="0" anchor="b"/>
+          <a:lstStyle>
+            <a:lvl1pPr algn="l">
+              <a:defRPr sz="1200"/>
+            </a:lvl1pPr>
+          </a:lstStyle>
+          <a:p>
+            <a:endParaRPr lang="ru-RU"/>
+          </a:p>
+        </p:txBody>
+      </p:sp>
+      <p:sp>
+        <p:nvSpPr>
+          <p:cNvPr id="7" name="Номер слайда 6"/>
+          <p:cNvSpPr>
+            <a:spLocks noGrp="1"/>
+          </p:cNvSpPr>
+          <p:nvPr>
+            <p:ph type="sldNum" sz="quarter" idx="5"/>
+          </p:nvPr>
+        </p:nvSpPr>
+        <p:spPr>
+          <a:xfrm>
+            <a:off x="3884613" y="8685213"/>
+            <a:ext cx="2971800" cy="458787"/>
+          </a:xfrm>
+          <a:prstGeom prst="rect">
+            <a:avLst/>
+          </a:prstGeom>
+        </p:spPr>
+        <p:txBody>
+          <a:bodyPr vert="horz" lIns="91440" tIns="45720" rIns="91440" bIns="45720" rtlCol="0" anchor="b"/>
+          <a:lstStyle>
+            <a:lvl1pPr algn="r">
+              <a:defRPr sz="1200"/>
+            </a:lvl1pPr>
+          </a:lstStyle>
+          <a:p>
+            <a:fld id="{FF4A4B4C-F1AB-4566-800F-DCE58AA7E0EB}" type="slidenum">
+              <a:rPr lang="ru-RU" smtClean="0"/>
+              <a:t>‹#›</a:t>
+            </a:fld>
+            <a:endParaRPr lang="ru-RU"/>
+          </a:p>
+        </p:txBody>
+      </p:sp>
+    </p:spTree>
+    <p:extLst>
+      <p:ext uri="{BB962C8B-B14F-4D97-AF65-F5344CB8AC3E}">
+        <p14:creationId xmlns:p14="http://schemas.microsoft.com/office/powerpoint/2010/main" val="2493734853"/>
+      </p:ext>
+    </p:extLst>
+  </p:cSld>
+  <p:clrMap bg1="lt1" tx1="dk1" bg2="lt2" tx2="dk2" accent1="accent1" accent2="accent2" accent3="accent3" accent4="accent4" accent5="accent5" accent6="accent6" hlink="hlink" folHlink="folHlink"/>
+  <p:notesStyle>
+    <a:lvl1pPr marL="0" algn="l" defTabSz="914400" rtl="0" eaLnBrk="1" latinLnBrk="0" hangingPunct="1">
+      <a:defRPr sz="1200" kern="1200">
+        <a:solidFill>
+          <a:schemeClr val="tx1"/>
+        </a:solidFill>
+        <a:latin typeface="+mn-lt"/>
+        <a:ea typeface="+mn-ea"/>
+        <a:cs typeface="+mn-cs"/>
+      </a:defRPr>
+    </a:lvl1pPr>
+    <a:lvl2pPr marL="457200" algn="l" defTabSz="914400" rtl="0" eaLnBrk="1" latinLnBrk="0" hangingPunct="1">
+      <a:defRPr sz="1200" kern="1200">
+        <a:solidFill>
+          <a:schemeClr val="tx1"/>
+        </a:solidFill>
+        <a:latin typeface="+mn-lt"/>
+        <a:ea typeface="+mn-ea"/>
+        <a:cs typeface="+mn-cs"/>
+      </a:defRPr>
+    </a:lvl2pPr>
+    <a:lvl3pPr marL="914400" algn="l" defTabSz="914400" rtl="0" eaLnBrk="1" latinLnBrk="0" hangingPunct="1">
+      <a:defRPr sz="1200" kern="1200">
+        <a:solidFill>
+          <a:schemeClr val="tx1"/>
+        </a:solidFill>
+        <a:latin typeface="+mn-lt"/>
+        <a:ea typeface="+mn-ea"/>
+        <a:cs typeface="+mn-cs"/>
+      </a:defRPr>
+    </a:lvl3pPr>
+    <a:lvl4pPr marL="1371600" algn="l" defTabSz="914400" rtl="0" eaLnBrk="1" latinLnBrk="0" hangingPunct="1">
+      <a:defRPr sz="1200" kern="1200">
+        <a:solidFill>
+          <a:schemeClr val="tx1"/>
+        </a:solidFill>
+        <a:latin typeface="+mn-lt"/>
+        <a:ea typeface="+mn-ea"/>
+        <a:cs typeface="+mn-cs"/>
+      </a:defRPr>
+    </a:lvl4pPr>
+    <a:lvl5pPr marL="1828800" algn="l" defTabSz="914400" rtl="0" eaLnBrk="1" latinLnBrk="0" hangingPunct="1">
+      <a:defRPr sz="1200" kern="1200">
+        <a:solidFill>
+          <a:schemeClr val="tx1"/>
+        </a:solidFill>
+        <a:latin typeface="+mn-lt"/>
+        <a:ea typeface="+mn-ea"/>
+        <a:cs typeface="+mn-cs"/>
+      </a:defRPr>
+    </a:lvl5pPr>
+    <a:lvl6pPr marL="2286000" algn="l" defTabSz="914400" rtl="0" eaLnBrk="1" latinLnBrk="0" hangingPunct="1">
+      <a:defRPr sz="1200" kern="1200">
+        <a:solidFill>
+          <a:schemeClr val="tx1"/>
+        </a:solidFill>
+        <a:latin typeface="+mn-lt"/>
+        <a:ea typeface="+mn-ea"/>
+        <a:cs typeface="+mn-cs"/>
+      </a:defRPr>
+    </a:lvl6pPr>
+    <a:lvl7pPr marL="2743200" algn="l" defTabSz="914400" rtl="0" eaLnBrk="1" latinLnBrk="0" hangingPunct="1">
+      <a:defRPr sz="1200" kern="1200">
+        <a:solidFill>
+          <a:schemeClr val="tx1"/>
+        </a:solidFill>
+        <a:latin typeface="+mn-lt"/>
+        <a:ea typeface="+mn-ea"/>
+        <a:cs typeface="+mn-cs"/>
+      </a:defRPr>
+    </a:lvl7pPr>
+    <a:lvl8pPr marL="3200400" algn="l" defTabSz="914400" rtl="0" eaLnBrk="1" latinLnBrk="0" hangingPunct="1">
+      <a:defRPr sz="1200" kern="1200">
+        <a:solidFill>
+          <a:schemeClr val="tx1"/>
+        </a:solidFill>
+        <a:latin typeface="+mn-lt"/>
+        <a:ea typeface="+mn-ea"/>
+        <a:cs typeface="+mn-cs"/>
+      </a:defRPr>
+    </a:lvl8pPr>
+    <a:lvl9pPr marL="3657600" algn="l" defTabSz="914400" rtl="0" eaLnBrk="1" latinLnBrk="0" hangingPunct="1">
+      <a:defRPr sz="1200" kern="1200">
+        <a:solidFill>
+          <a:schemeClr val="tx1"/>
+        </a:solidFill>
+        <a:latin typeface="+mn-lt"/>
+        <a:ea typeface="+mn-ea"/>
+        <a:cs typeface="+mn-cs"/>
+      </a:defRPr>
+    </a:lvl9pPr>
+  </p:notesStyle>
+</p:notesMaster>
+</file>
+
+<file path=ppt/notesSlides/notesSlide1.xml><?xml version="1.0" encoding="utf-8"?>
+<p:notes xmlns:a="http://schemas.openxmlformats.org/drawingml/2006/main" xmlns:r="http://schemas.openxmlformats.org/officeDocument/2006/relationships" xmlns:p="http://schemas.openxmlformats.org/presentationml/2006/main">
+  <p:cSld>
+    <p:spTree>
+      <p:nvGrpSpPr>
+        <p:cNvPr id="1" name=""/>
+        <p:cNvGrpSpPr/>
+        <p:nvPr/>
+      </p:nvGrpSpPr>
+      <p:grpSpPr>
+        <a:xfrm>
+          <a:off x="0" y="0"/>
+          <a:ext cx="0" cy="0"/>
+          <a:chOff x="0" y="0"/>
+          <a:chExt cx="0" cy="0"/>
+        </a:xfrm>
+      </p:grpSpPr>
+      <p:sp>
+        <p:nvSpPr>
+          <p:cNvPr id="2" name="Образ слайда 1"/>
+          <p:cNvSpPr>
+            <a:spLocks noGrp="1" noRot="1" noChangeAspect="1"/>
+          </p:cNvSpPr>
+          <p:nvPr>
+            <p:ph type="sldImg"/>
+          </p:nvPr>
+        </p:nvSpPr>
+        <p:spPr/>
+      </p:sp>
+      <p:sp>
+        <p:nvSpPr>
+          <p:cNvPr id="3" name="Заметки 2"/>
+          <p:cNvSpPr>
+            <a:spLocks noGrp="1"/>
+          </p:cNvSpPr>
+          <p:nvPr>
+            <p:ph type="body" idx="1"/>
+          </p:nvPr>
+        </p:nvSpPr>
+        <p:spPr/>
+        <p:txBody>
+          <a:bodyPr/>
+          <a:lstStyle/>
+          <a:p>
+            <a:r>
+              <a:rPr lang="ru-RU" dirty="0"/>
+              <a:t>Презентация кратного представления проекта </a:t>
+            </a:r>
+            <a:r>
+              <a:rPr lang="en-US" dirty="0"/>
+              <a:t>Smart Home System.</a:t>
+            </a:r>
+            <a:r>
+              <a:rPr lang="ru-RU" dirty="0"/>
+              <a:t> Для подробного ознакомления рекомендуется прочтение документации на </a:t>
+            </a:r>
+            <a:r>
+              <a:rPr lang="ru-RU" dirty="0" err="1"/>
+              <a:t>гитхабе</a:t>
+            </a:r>
+            <a:r>
+              <a:rPr lang="ru-RU" dirty="0"/>
+              <a:t>: </a:t>
+            </a:r>
+            <a:r>
+              <a:rPr lang="en-US" dirty="0"/>
+              <a:t>https://github.com/MrRyabena/SmartHomeSystem</a:t>
+            </a:r>
+            <a:r>
+              <a:rPr lang="ru-RU" dirty="0"/>
+              <a:t>.</a:t>
+            </a:r>
+          </a:p>
+        </p:txBody>
+      </p:sp>
+      <p:sp>
+        <p:nvSpPr>
+          <p:cNvPr id="4" name="Номер слайда 3"/>
+          <p:cNvSpPr>
+            <a:spLocks noGrp="1"/>
+          </p:cNvSpPr>
+          <p:nvPr>
+            <p:ph type="sldNum" sz="quarter" idx="5"/>
+          </p:nvPr>
+        </p:nvSpPr>
+        <p:spPr/>
+        <p:txBody>
+          <a:bodyPr/>
+          <a:lstStyle/>
+          <a:p>
+            <a:fld id="{FF4A4B4C-F1AB-4566-800F-DCE58AA7E0EB}" type="slidenum">
+              <a:rPr lang="ru-RU" smtClean="0"/>
+              <a:t>1</a:t>
+            </a:fld>
+            <a:endParaRPr lang="ru-RU"/>
+          </a:p>
+        </p:txBody>
+      </p:sp>
+    </p:spTree>
+    <p:extLst>
+      <p:ext uri="{BB962C8B-B14F-4D97-AF65-F5344CB8AC3E}">
+        <p14:creationId xmlns:p14="http://schemas.microsoft.com/office/powerpoint/2010/main" val="3697554629"/>
+      </p:ext>
+    </p:extLst>
+  </p:cSld>
+  <p:clrMapOvr>
+    <a:masterClrMapping/>
+  </p:clrMapOvr>
+</p:notes>
+</file>
+
+<file path=ppt/notesSlides/notesSlide2.xml><?xml version="1.0" encoding="utf-8"?>
+<p:notes xmlns:a="http://schemas.openxmlformats.org/drawingml/2006/main" xmlns:r="http://schemas.openxmlformats.org/officeDocument/2006/relationships" xmlns:p="http://schemas.openxmlformats.org/presentationml/2006/main">
+  <p:cSld>
+    <p:spTree>
+      <p:nvGrpSpPr>
+        <p:cNvPr id="1" name=""/>
+        <p:cNvGrpSpPr/>
+        <p:nvPr/>
+      </p:nvGrpSpPr>
+      <p:grpSpPr>
+        <a:xfrm>
+          <a:off x="0" y="0"/>
+          <a:ext cx="0" cy="0"/>
+          <a:chOff x="0" y="0"/>
+          <a:chExt cx="0" cy="0"/>
+        </a:xfrm>
+      </p:grpSpPr>
+      <p:sp>
+        <p:nvSpPr>
+          <p:cNvPr id="2" name="Образ слайда 1"/>
+          <p:cNvSpPr>
+            <a:spLocks noGrp="1" noRot="1" noChangeAspect="1"/>
+          </p:cNvSpPr>
+          <p:nvPr>
+            <p:ph type="sldImg"/>
+          </p:nvPr>
+        </p:nvSpPr>
+        <p:spPr/>
+      </p:sp>
+      <p:sp>
+        <p:nvSpPr>
+          <p:cNvPr id="3" name="Заметки 2"/>
+          <p:cNvSpPr>
+            <a:spLocks noGrp="1"/>
+          </p:cNvSpPr>
+          <p:nvPr>
+            <p:ph type="body" idx="1"/>
+          </p:nvPr>
+        </p:nvSpPr>
+        <p:spPr/>
+        <p:txBody>
+          <a:bodyPr/>
+          <a:lstStyle/>
+          <a:p>
+            <a:endParaRPr lang="ru-RU" dirty="0"/>
+          </a:p>
+        </p:txBody>
+      </p:sp>
+      <p:sp>
+        <p:nvSpPr>
+          <p:cNvPr id="4" name="Номер слайда 3"/>
+          <p:cNvSpPr>
+            <a:spLocks noGrp="1"/>
+          </p:cNvSpPr>
+          <p:nvPr>
+            <p:ph type="sldNum" sz="quarter" idx="5"/>
+          </p:nvPr>
+        </p:nvSpPr>
+        <p:spPr/>
+        <p:txBody>
+          <a:bodyPr/>
+          <a:lstStyle/>
+          <a:p>
+            <a:fld id="{FF4A4B4C-F1AB-4566-800F-DCE58AA7E0EB}" type="slidenum">
+              <a:rPr lang="ru-RU" smtClean="0"/>
+              <a:t>2</a:t>
+            </a:fld>
+            <a:endParaRPr lang="ru-RU"/>
+          </a:p>
+        </p:txBody>
+      </p:sp>
+    </p:spTree>
+    <p:extLst>
+      <p:ext uri="{BB962C8B-B14F-4D97-AF65-F5344CB8AC3E}">
+        <p14:creationId xmlns:p14="http://schemas.microsoft.com/office/powerpoint/2010/main" val="630765557"/>
+      </p:ext>
+    </p:extLst>
+  </p:cSld>
+  <p:clrMapOvr>
+    <a:masterClrMapping/>
+  </p:clrMapOvr>
+</p:notes>
+</file>
+
 <file path=ppt/slideLayouts/slideLayout1.xml><?xml version="1.0" encoding="utf-8"?>
 <p:sldLayout xmlns:a="http://schemas.openxmlformats.org/drawingml/2006/main" xmlns:r="http://schemas.openxmlformats.org/officeDocument/2006/relationships" xmlns:p="http://schemas.openxmlformats.org/presentationml/2006/main" type="title" preserve="1">
   <p:cSld name="Титульный слайд">
@@ -260,7 +820,7 @@
           <a:p>
             <a:fld id="{BBC8FBA2-46D2-4FB1-B98C-7F1EDA543B45}" type="datetimeFigureOut">
               <a:rPr lang="ru-RU" smtClean="0"/>
-              <a:t>11.02.2024</a:t>
+              <a:t>17.02.2024</a:t>
             </a:fld>
             <a:endParaRPr lang="ru-RU"/>
           </a:p>
@@ -458,7 +1018,7 @@
           <a:p>
             <a:fld id="{BBC8FBA2-46D2-4FB1-B98C-7F1EDA543B45}" type="datetimeFigureOut">
               <a:rPr lang="ru-RU" smtClean="0"/>
-              <a:t>11.02.2024</a:t>
+              <a:t>17.02.2024</a:t>
             </a:fld>
             <a:endParaRPr lang="ru-RU"/>
           </a:p>
@@ -666,7 +1226,7 @@
           <a:p>
             <a:fld id="{BBC8FBA2-46D2-4FB1-B98C-7F1EDA543B45}" type="datetimeFigureOut">
               <a:rPr lang="ru-RU" smtClean="0"/>
-              <a:t>11.02.2024</a:t>
+              <a:t>17.02.2024</a:t>
             </a:fld>
             <a:endParaRPr lang="ru-RU"/>
           </a:p>
@@ -864,7 +1424,7 @@
           <a:p>
             <a:fld id="{BBC8FBA2-46D2-4FB1-B98C-7F1EDA543B45}" type="datetimeFigureOut">
               <a:rPr lang="ru-RU" smtClean="0"/>
-              <a:t>11.02.2024</a:t>
+              <a:t>17.02.2024</a:t>
             </a:fld>
             <a:endParaRPr lang="ru-RU"/>
           </a:p>
@@ -1139,7 +1699,7 @@
           <a:p>
             <a:fld id="{BBC8FBA2-46D2-4FB1-B98C-7F1EDA543B45}" type="datetimeFigureOut">
               <a:rPr lang="ru-RU" smtClean="0"/>
-              <a:t>11.02.2024</a:t>
+              <a:t>17.02.2024</a:t>
             </a:fld>
             <a:endParaRPr lang="ru-RU"/>
           </a:p>
@@ -1404,7 +1964,7 @@
           <a:p>
             <a:fld id="{BBC8FBA2-46D2-4FB1-B98C-7F1EDA543B45}" type="datetimeFigureOut">
               <a:rPr lang="ru-RU" smtClean="0"/>
-              <a:t>11.02.2024</a:t>
+              <a:t>17.02.2024</a:t>
             </a:fld>
             <a:endParaRPr lang="ru-RU"/>
           </a:p>
@@ -1816,7 +2376,7 @@
           <a:p>
             <a:fld id="{BBC8FBA2-46D2-4FB1-B98C-7F1EDA543B45}" type="datetimeFigureOut">
               <a:rPr lang="ru-RU" smtClean="0"/>
-              <a:t>11.02.2024</a:t>
+              <a:t>17.02.2024</a:t>
             </a:fld>
             <a:endParaRPr lang="ru-RU"/>
           </a:p>
@@ -1957,7 +2517,7 @@
           <a:p>
             <a:fld id="{BBC8FBA2-46D2-4FB1-B98C-7F1EDA543B45}" type="datetimeFigureOut">
               <a:rPr lang="ru-RU" smtClean="0"/>
-              <a:t>11.02.2024</a:t>
+              <a:t>17.02.2024</a:t>
             </a:fld>
             <a:endParaRPr lang="ru-RU"/>
           </a:p>
@@ -2070,7 +2630,7 @@
           <a:p>
             <a:fld id="{BBC8FBA2-46D2-4FB1-B98C-7F1EDA543B45}" type="datetimeFigureOut">
               <a:rPr lang="ru-RU" smtClean="0"/>
-              <a:t>11.02.2024</a:t>
+              <a:t>17.02.2024</a:t>
             </a:fld>
             <a:endParaRPr lang="ru-RU"/>
           </a:p>
@@ -2381,7 +2941,7 @@
           <a:p>
             <a:fld id="{BBC8FBA2-46D2-4FB1-B98C-7F1EDA543B45}" type="datetimeFigureOut">
               <a:rPr lang="ru-RU" smtClean="0"/>
-              <a:t>11.02.2024</a:t>
+              <a:t>17.02.2024</a:t>
             </a:fld>
             <a:endParaRPr lang="ru-RU"/>
           </a:p>
@@ -2669,7 +3229,7 @@
           <a:p>
             <a:fld id="{BBC8FBA2-46D2-4FB1-B98C-7F1EDA543B45}" type="datetimeFigureOut">
               <a:rPr lang="ru-RU" smtClean="0"/>
-              <a:t>11.02.2024</a:t>
+              <a:t>17.02.2024</a:t>
             </a:fld>
             <a:endParaRPr lang="ru-RU"/>
           </a:p>
@@ -2910,7 +3470,7 @@
           <a:p>
             <a:fld id="{BBC8FBA2-46D2-4FB1-B98C-7F1EDA543B45}" type="datetimeFigureOut">
               <a:rPr lang="ru-RU" smtClean="0"/>
-              <a:t>11.02.2024</a:t>
+              <a:t>17.02.2024</a:t>
             </a:fld>
             <a:endParaRPr lang="ru-RU"/>
           </a:p>
@@ -3327,6 +3887,42 @@
           <a:chExt cx="0" cy="0"/>
         </a:xfrm>
       </p:grpSpPr>
+      <p:pic>
+        <p:nvPicPr>
+          <p:cNvPr id="15" name="Рисунок 14">
+            <a:extLst>
+              <a:ext uri="{FF2B5EF4-FFF2-40B4-BE49-F238E27FC236}">
+                <a16:creationId xmlns:a16="http://schemas.microsoft.com/office/drawing/2014/main" id="{054E626C-4372-4967-99E7-A5734EBFE954}"/>
+              </a:ext>
+            </a:extLst>
+          </p:cNvPr>
+          <p:cNvPicPr>
+            <a:picLocks noChangeAspect="1"/>
+          </p:cNvPicPr>
+          <p:nvPr/>
+        </p:nvPicPr>
+        <p:blipFill>
+          <a:blip r:embed="rId3">
+            <a:extLst>
+              <a:ext uri="{28A0092B-C50C-407E-A947-70E740481C1C}">
+                <a14:useLocalDpi xmlns:a14="http://schemas.microsoft.com/office/drawing/2010/main" val="0"/>
+              </a:ext>
+            </a:extLst>
+          </a:blip>
+          <a:stretch>
+            <a:fillRect/>
+          </a:stretch>
+        </p:blipFill>
+        <p:spPr>
+          <a:xfrm>
+            <a:off x="2667000" y="722380"/>
+            <a:ext cx="6858000" cy="6858000"/>
+          </a:xfrm>
+          <a:prstGeom prst="rect">
+            <a:avLst/>
+          </a:prstGeom>
+        </p:spPr>
+      </p:pic>
       <p:sp>
         <p:nvSpPr>
           <p:cNvPr id="2" name="Заголовок 1">
@@ -3343,82 +3939,53 @@
             <p:ph type="ctrTitle"/>
           </p:nvPr>
         </p:nvSpPr>
-        <p:spPr/>
-        <p:txBody>
-          <a:bodyPr/>
-          <a:lstStyle/>
-          <a:p>
-            <a:r>
-              <a:rPr lang="en-US" dirty="0">
+        <p:spPr>
+          <a:xfrm>
+            <a:off x="1517513" y="570740"/>
+            <a:ext cx="9414551" cy="1141480"/>
+          </a:xfrm>
+        </p:spPr>
+        <p:txBody>
+          <a:bodyPr>
+            <a:normAutofit/>
+          </a:bodyPr>
+          <a:lstStyle/>
+          <a:p>
+            <a:r>
+              <a:rPr lang="en-US" sz="6600" b="1" dirty="0">
                 <a:solidFill>
                   <a:schemeClr val="bg1">
                     <a:lumMod val="10000"/>
                     <a:lumOff val="90000"/>
                   </a:schemeClr>
                 </a:solidFill>
+                <a:effectLst>
+                  <a:outerShdw blurRad="38100" dist="38100" dir="2700000" algn="tl">
+                    <a:srgbClr val="000000">
+                      <a:alpha val="43137"/>
+                    </a:srgbClr>
+                  </a:outerShdw>
+                </a:effectLst>
+                <a:latin typeface="Franklin Gothic Book" panose="020B0503020102020204" pitchFamily="34" charset="0"/>
               </a:rPr>
               <a:t>Smart Home System</a:t>
             </a:r>
-            <a:endParaRPr lang="ru-RU" dirty="0">
+            <a:endParaRPr lang="ru-RU" sz="6600" b="1" dirty="0">
               <a:solidFill>
                 <a:schemeClr val="bg1">
                   <a:lumMod val="10000"/>
                   <a:lumOff val="90000"/>
                 </a:schemeClr>
               </a:solidFill>
+              <a:effectLst>
+                <a:outerShdw blurRad="38100" dist="38100" dir="2700000" algn="tl">
+                  <a:srgbClr val="000000">
+                    <a:alpha val="43137"/>
+                  </a:srgbClr>
+                </a:outerShdw>
+              </a:effectLst>
+              <a:latin typeface="Franklin Gothic Book" panose="020B0503020102020204" pitchFamily="34" charset="0"/>
             </a:endParaRPr>
-          </a:p>
-        </p:txBody>
-      </p:sp>
-      <p:sp>
-        <p:nvSpPr>
-          <p:cNvPr id="3" name="Подзаголовок 2">
-            <a:extLst>
-              <a:ext uri="{FF2B5EF4-FFF2-40B4-BE49-F238E27FC236}">
-                <a16:creationId xmlns:a16="http://schemas.microsoft.com/office/drawing/2014/main" id="{2D56ADD4-5684-4C13-9127-058758CCC9B3}"/>
-              </a:ext>
-            </a:extLst>
-          </p:cNvPr>
-          <p:cNvSpPr>
-            <a:spLocks noGrp="1"/>
-          </p:cNvSpPr>
-          <p:nvPr>
-            <p:ph type="subTitle" idx="1"/>
-          </p:nvPr>
-        </p:nvSpPr>
-        <p:spPr>
-          <a:xfrm>
-            <a:off x="2438400" y="4079875"/>
-            <a:ext cx="9144000" cy="1655762"/>
-          </a:xfrm>
-        </p:spPr>
-        <p:txBody>
-          <a:bodyPr/>
-          <a:lstStyle/>
-          <a:p>
-            <a:pPr algn="r"/>
-            <a:r>
-              <a:rPr lang="en-US" dirty="0">
-                <a:solidFill>
-                  <a:schemeClr val="bg1">
-                    <a:lumMod val="10000"/>
-                    <a:lumOff val="90000"/>
-                  </a:schemeClr>
-                </a:solidFill>
-              </a:rPr>
-              <a:t>The technology of the future is at your feet</a:t>
-            </a:r>
-            <a:r>
-              <a:rPr lang="ru-RU" dirty="0">
-                <a:solidFill>
-                  <a:schemeClr val="bg1">
-                    <a:lumMod val="10000"/>
-                    <a:lumOff val="90000"/>
-                  </a:schemeClr>
-                </a:solidFill>
-              </a:rPr>
-              <a:t>.</a:t>
-            </a:r>
           </a:p>
         </p:txBody>
       </p:sp>
@@ -3457,6 +4024,86 @@
           <p:cNvPr id="2" name="Заголовок 1">
             <a:extLst>
               <a:ext uri="{FF2B5EF4-FFF2-40B4-BE49-F238E27FC236}">
+                <a16:creationId xmlns:a16="http://schemas.microsoft.com/office/drawing/2014/main" id="{82C825C7-B537-4737-A4DC-76CA13A8AAF8}"/>
+              </a:ext>
+            </a:extLst>
+          </p:cNvPr>
+          <p:cNvSpPr>
+            <a:spLocks noGrp="1"/>
+          </p:cNvSpPr>
+          <p:nvPr>
+            <p:ph type="title"/>
+          </p:nvPr>
+        </p:nvSpPr>
+        <p:spPr/>
+        <p:txBody>
+          <a:bodyPr/>
+          <a:lstStyle/>
+          <a:p>
+            <a:endParaRPr lang="ru-RU" dirty="0"/>
+          </a:p>
+        </p:txBody>
+      </p:sp>
+      <p:sp>
+        <p:nvSpPr>
+          <p:cNvPr id="3" name="Объект 2">
+            <a:extLst>
+              <a:ext uri="{FF2B5EF4-FFF2-40B4-BE49-F238E27FC236}">
+                <a16:creationId xmlns:a16="http://schemas.microsoft.com/office/drawing/2014/main" id="{608EE095-2482-4A9D-9808-27D1CAC6F56B}"/>
+              </a:ext>
+            </a:extLst>
+          </p:cNvPr>
+          <p:cNvSpPr>
+            <a:spLocks noGrp="1"/>
+          </p:cNvSpPr>
+          <p:nvPr>
+            <p:ph idx="1"/>
+          </p:nvPr>
+        </p:nvSpPr>
+        <p:spPr/>
+        <p:txBody>
+          <a:bodyPr/>
+          <a:lstStyle/>
+          <a:p>
+            <a:endParaRPr lang="ru-RU"/>
+          </a:p>
+        </p:txBody>
+      </p:sp>
+    </p:spTree>
+    <p:extLst>
+      <p:ext uri="{BB962C8B-B14F-4D97-AF65-F5344CB8AC3E}">
+        <p14:creationId xmlns:p14="http://schemas.microsoft.com/office/powerpoint/2010/main" val="3198567159"/>
+      </p:ext>
+    </p:extLst>
+  </p:cSld>
+  <p:clrMapOvr>
+    <a:masterClrMapping/>
+  </p:clrMapOvr>
+</p:sld>
+</file>
+
+<file path=ppt/slides/slide3.xml><?xml version="1.0" encoding="utf-8"?>
+<p:sld xmlns:a="http://schemas.openxmlformats.org/drawingml/2006/main" xmlns:r="http://schemas.openxmlformats.org/officeDocument/2006/relationships" xmlns:p="http://schemas.openxmlformats.org/presentationml/2006/main">
+  <p:cSld>
+    <p:spTree>
+      <p:nvGrpSpPr>
+        <p:cNvPr id="1" name=""/>
+        <p:cNvGrpSpPr/>
+        <p:nvPr/>
+      </p:nvGrpSpPr>
+      <p:grpSpPr>
+        <a:xfrm>
+          <a:off x="0" y="0"/>
+          <a:ext cx="0" cy="0"/>
+          <a:chOff x="0" y="0"/>
+          <a:chExt cx="0" cy="0"/>
+        </a:xfrm>
+      </p:grpSpPr>
+      <p:sp>
+        <p:nvSpPr>
+          <p:cNvPr id="2" name="Заголовок 1">
+            <a:extLst>
+              <a:ext uri="{FF2B5EF4-FFF2-40B4-BE49-F238E27FC236}">
                 <a16:creationId xmlns:a16="http://schemas.microsoft.com/office/drawing/2014/main" id="{6FEE4C37-DF0C-4DE2-A92E-D2202F58C60A}"/>
               </a:ext>
             </a:extLst>
@@ -3473,32 +4120,106 @@
           <a:bodyPr/>
           <a:lstStyle/>
           <a:p>
+            <a:endParaRPr lang="ru-RU" dirty="0"/>
+          </a:p>
+        </p:txBody>
+      </p:sp>
+      <p:pic>
+        <p:nvPicPr>
+          <p:cNvPr id="5" name="Объект 4">
+            <a:extLst>
+              <a:ext uri="{FF2B5EF4-FFF2-40B4-BE49-F238E27FC236}">
+                <a16:creationId xmlns:a16="http://schemas.microsoft.com/office/drawing/2014/main" id="{A2F17E51-9EAA-43B4-BDF8-0187C500567F}"/>
+              </a:ext>
+            </a:extLst>
+          </p:cNvPr>
+          <p:cNvPicPr>
+            <a:picLocks noGrp="1" noChangeAspect="1"/>
+          </p:cNvPicPr>
+          <p:nvPr>
+            <p:ph idx="1"/>
+          </p:nvPr>
+        </p:nvPicPr>
+        <p:blipFill>
+          <a:blip r:embed="rId2">
+            <a:extLst>
+              <a:ext uri="{28A0092B-C50C-407E-A947-70E740481C1C}">
+                <a14:useLocalDpi xmlns:a14="http://schemas.microsoft.com/office/drawing/2010/main" val="0"/>
+              </a:ext>
+            </a:extLst>
+          </a:blip>
+          <a:stretch>
+            <a:fillRect/>
+          </a:stretch>
+        </p:blipFill>
+        <p:spPr>
+          <a:xfrm>
+            <a:off x="10768603" y="5518909"/>
+            <a:ext cx="1423397" cy="1423397"/>
+          </a:xfrm>
+        </p:spPr>
+      </p:pic>
+      <p:sp>
+        <p:nvSpPr>
+          <p:cNvPr id="7" name="Овал 6">
+            <a:extLst>
+              <a:ext uri="{FF2B5EF4-FFF2-40B4-BE49-F238E27FC236}">
+                <a16:creationId xmlns:a16="http://schemas.microsoft.com/office/drawing/2014/main" id="{FEFAA059-48F2-4B4A-A535-08EF96EE2715}"/>
+              </a:ext>
+            </a:extLst>
+          </p:cNvPr>
+          <p:cNvSpPr>
+            <a:spLocks noChangeAspect="1"/>
+          </p:cNvSpPr>
+          <p:nvPr/>
+        </p:nvSpPr>
+        <p:spPr>
+          <a:xfrm>
+            <a:off x="-1838325" y="-1042987"/>
+            <a:ext cx="8782050" cy="8782050"/>
+          </a:xfrm>
+          <a:prstGeom prst="ellipse">
+            <a:avLst/>
+          </a:prstGeom>
+          <a:blipFill dpi="0" rotWithShape="1">
+            <a:blip r:embed="rId3">
+              <a:extLst>
+                <a:ext uri="{28A0092B-C50C-407E-A947-70E740481C1C}">
+                  <a14:useLocalDpi xmlns:a14="http://schemas.microsoft.com/office/drawing/2010/main" val="0"/>
+                </a:ext>
+              </a:extLst>
+            </a:blip>
+            <a:srcRect/>
+            <a:tile tx="-1917700" ty="825500" sx="88000" sy="88000" flip="none" algn="tl"/>
+          </a:blipFill>
+          <a:ln w="50800">
+            <a:solidFill>
+              <a:schemeClr val="accent1"/>
+            </a:solidFill>
+          </a:ln>
+        </p:spPr>
+        <p:style>
+          <a:lnRef idx="2">
+            <a:schemeClr val="accent1">
+              <a:shade val="50000"/>
+            </a:schemeClr>
+          </a:lnRef>
+          <a:fillRef idx="1">
+            <a:schemeClr val="accent1"/>
+          </a:fillRef>
+          <a:effectRef idx="0">
+            <a:schemeClr val="accent1"/>
+          </a:effectRef>
+          <a:fontRef idx="minor">
+            <a:schemeClr val="lt1"/>
+          </a:fontRef>
+        </p:style>
+        <p:txBody>
+          <a:bodyPr rtlCol="0" anchor="ctr"/>
+          <a:lstStyle/>
+          <a:p>
+            <a:pPr algn="ctr"/>
             <a:endParaRPr lang="ru-RU"/>
-          </a:p>
-        </p:txBody>
-      </p:sp>
-      <p:sp>
-        <p:nvSpPr>
-          <p:cNvPr id="3" name="Объект 2">
-            <a:extLst>
-              <a:ext uri="{FF2B5EF4-FFF2-40B4-BE49-F238E27FC236}">
-                <a16:creationId xmlns:a16="http://schemas.microsoft.com/office/drawing/2014/main" id="{9A691556-5CED-4271-8106-6712B1040652}"/>
-              </a:ext>
-            </a:extLst>
-          </p:cNvPr>
-          <p:cNvSpPr>
-            <a:spLocks noGrp="1"/>
-          </p:cNvSpPr>
-          <p:nvPr>
-            <p:ph idx="1"/>
-          </p:nvPr>
-        </p:nvSpPr>
-        <p:spPr/>
-        <p:txBody>
-          <a:bodyPr/>
-          <a:lstStyle/>
-          <a:p>
-            <a:endParaRPr lang="ru-RU" dirty="0"/>
           </a:p>
         </p:txBody>
       </p:sp>
@@ -3808,4 +4529,299 @@
     </a:ext>
   </a:extLst>
 </a:theme>
+</file>
+
+<file path=ppt/theme/theme2.xml><?xml version="1.0" encoding="utf-8"?>
+<a:theme xmlns:a="http://schemas.openxmlformats.org/drawingml/2006/main" name="Тема Office">
+  <a:themeElements>
+    <a:clrScheme name="Стандартная">
+      <a:dk1>
+        <a:sysClr val="windowText" lastClr="000000"/>
+      </a:dk1>
+      <a:lt1>
+        <a:sysClr val="window" lastClr="FFFFFF"/>
+      </a:lt1>
+      <a:dk2>
+        <a:srgbClr val="44546A"/>
+      </a:dk2>
+      <a:lt2>
+        <a:srgbClr val="E7E6E6"/>
+      </a:lt2>
+      <a:accent1>
+        <a:srgbClr val="4472C4"/>
+      </a:accent1>
+      <a:accent2>
+        <a:srgbClr val="ED7D31"/>
+      </a:accent2>
+      <a:accent3>
+        <a:srgbClr val="A5A5A5"/>
+      </a:accent3>
+      <a:accent4>
+        <a:srgbClr val="FFC000"/>
+      </a:accent4>
+      <a:accent5>
+        <a:srgbClr val="5B9BD5"/>
+      </a:accent5>
+      <a:accent6>
+        <a:srgbClr val="70AD47"/>
+      </a:accent6>
+      <a:hlink>
+        <a:srgbClr val="0563C1"/>
+      </a:hlink>
+      <a:folHlink>
+        <a:srgbClr val="954F72"/>
+      </a:folHlink>
+    </a:clrScheme>
+    <a:fontScheme name="Стандартная">
+      <a:majorFont>
+        <a:latin typeface="Calibri Light" panose="020F0302020204030204"/>
+        <a:ea typeface=""/>
+        <a:cs typeface=""/>
+        <a:font script="Jpan" typeface="游ゴシック Light"/>
+        <a:font script="Hang" typeface="맑은 고딕"/>
+        <a:font script="Hans" typeface="等线 Light"/>
+        <a:font script="Hant" typeface="新細明體"/>
+        <a:font script="Arab" typeface="Times New Roman"/>
+        <a:font script="Hebr" typeface="Times New Roman"/>
+        <a:font script="Thai" typeface="Angsana New"/>
+        <a:font script="Ethi" typeface="Nyala"/>
+        <a:font script="Beng" typeface="Vrinda"/>
+        <a:font script="Gujr" typeface="Shruti"/>
+        <a:font script="Khmr" typeface="MoolBoran"/>
+        <a:font script="Knda" typeface="Tunga"/>
+        <a:font script="Guru" typeface="Raavi"/>
+        <a:font script="Cans" typeface="Euphemia"/>
+        <a:font script="Cher" typeface="Plantagenet Cherokee"/>
+        <a:font script="Yiii" typeface="Microsoft Yi Baiti"/>
+        <a:font script="Tibt" typeface="Microsoft Himalaya"/>
+        <a:font script="Thaa" typeface="MV Boli"/>
+        <a:font script="Deva" typeface="Mangal"/>
+        <a:font script="Telu" typeface="Gautami"/>
+        <a:font script="Taml" typeface="Latha"/>
+        <a:font script="Syrc" typeface="Estrangelo Edessa"/>
+        <a:font script="Orya" typeface="Kalinga"/>
+        <a:font script="Mlym" typeface="Kartika"/>
+        <a:font script="Laoo" typeface="DokChampa"/>
+        <a:font script="Sinh" typeface="Iskoola Pota"/>
+        <a:font script="Mong" typeface="Mongolian Baiti"/>
+        <a:font script="Viet" typeface="Times New Roman"/>
+        <a:font script="Uigh" typeface="Microsoft Uighur"/>
+        <a:font script="Geor" typeface="Sylfaen"/>
+        <a:font script="Armn" typeface="Arial"/>
+        <a:font script="Bugi" typeface="Leelawadee UI"/>
+        <a:font script="Bopo" typeface="Microsoft JhengHei"/>
+        <a:font script="Java" typeface="Javanese Text"/>
+        <a:font script="Lisu" typeface="Segoe UI"/>
+        <a:font script="Mymr" typeface="Myanmar Text"/>
+        <a:font script="Nkoo" typeface="Ebrima"/>
+        <a:font script="Olck" typeface="Nirmala UI"/>
+        <a:font script="Osma" typeface="Ebrima"/>
+        <a:font script="Phag" typeface="Phagspa"/>
+        <a:font script="Syrn" typeface="Estrangelo Edessa"/>
+        <a:font script="Syrj" typeface="Estrangelo Edessa"/>
+        <a:font script="Syre" typeface="Estrangelo Edessa"/>
+        <a:font script="Sora" typeface="Nirmala UI"/>
+        <a:font script="Tale" typeface="Microsoft Tai Le"/>
+        <a:font script="Talu" typeface="Microsoft New Tai Lue"/>
+        <a:font script="Tfng" typeface="Ebrima"/>
+      </a:majorFont>
+      <a:minorFont>
+        <a:latin typeface="Calibri" panose="020F0502020204030204"/>
+        <a:ea typeface=""/>
+        <a:cs typeface=""/>
+        <a:font script="Jpan" typeface="游ゴシック"/>
+        <a:font script="Hang" typeface="맑은 고딕"/>
+        <a:font script="Hans" typeface="等线"/>
+        <a:font script="Hant" typeface="新細明體"/>
+        <a:font script="Arab" typeface="Arial"/>
+        <a:font script="Hebr" typeface="Arial"/>
+        <a:font script="Thai" typeface="Cordia New"/>
+        <a:font script="Ethi" typeface="Nyala"/>
+        <a:font script="Beng" typeface="Vrinda"/>
+        <a:font script="Gujr" typeface="Shruti"/>
+        <a:font script="Khmr" typeface="DaunPenh"/>
+        <a:font script="Knda" typeface="Tunga"/>
+        <a:font script="Guru" typeface="Raavi"/>
+        <a:font script="Cans" typeface="Euphemia"/>
+        <a:font script="Cher" typeface="Plantagenet Cherokee"/>
+        <a:font script="Yiii" typeface="Microsoft Yi Baiti"/>
+        <a:font script="Tibt" typeface="Microsoft Himalaya"/>
+        <a:font script="Thaa" typeface="MV Boli"/>
+        <a:font script="Deva" typeface="Mangal"/>
+        <a:font script="Telu" typeface="Gautami"/>
+        <a:font script="Taml" typeface="Latha"/>
+        <a:font script="Syrc" typeface="Estrangelo Edessa"/>
+        <a:font script="Orya" typeface="Kalinga"/>
+        <a:font script="Mlym" typeface="Kartika"/>
+        <a:font script="Laoo" typeface="DokChampa"/>
+        <a:font script="Sinh" typeface="Iskoola Pota"/>
+        <a:font script="Mong" typeface="Mongolian Baiti"/>
+        <a:font script="Viet" typeface="Arial"/>
+        <a:font script="Uigh" typeface="Microsoft Uighur"/>
+        <a:font script="Geor" typeface="Sylfaen"/>
+        <a:font script="Armn" typeface="Arial"/>
+        <a:font script="Bugi" typeface="Leelawadee UI"/>
+        <a:font script="Bopo" typeface="Microsoft JhengHei"/>
+        <a:font script="Java" typeface="Javanese Text"/>
+        <a:font script="Lisu" typeface="Segoe UI"/>
+        <a:font script="Mymr" typeface="Myanmar Text"/>
+        <a:font script="Nkoo" typeface="Ebrima"/>
+        <a:font script="Olck" typeface="Nirmala UI"/>
+        <a:font script="Osma" typeface="Ebrima"/>
+        <a:font script="Phag" typeface="Phagspa"/>
+        <a:font script="Syrn" typeface="Estrangelo Edessa"/>
+        <a:font script="Syrj" typeface="Estrangelo Edessa"/>
+        <a:font script="Syre" typeface="Estrangelo Edessa"/>
+        <a:font script="Sora" typeface="Nirmala UI"/>
+        <a:font script="Tale" typeface="Microsoft Tai Le"/>
+        <a:font script="Talu" typeface="Microsoft New Tai Lue"/>
+        <a:font script="Tfng" typeface="Ebrima"/>
+      </a:minorFont>
+    </a:fontScheme>
+    <a:fmtScheme name="Стандартная">
+      <a:fillStyleLst>
+        <a:solidFill>
+          <a:schemeClr val="phClr"/>
+        </a:solidFill>
+        <a:gradFill rotWithShape="1">
+          <a:gsLst>
+            <a:gs pos="0">
+              <a:schemeClr val="phClr">
+                <a:lumMod val="110000"/>
+                <a:satMod val="105000"/>
+                <a:tint val="67000"/>
+              </a:schemeClr>
+            </a:gs>
+            <a:gs pos="50000">
+              <a:schemeClr val="phClr">
+                <a:lumMod val="105000"/>
+                <a:satMod val="103000"/>
+                <a:tint val="73000"/>
+              </a:schemeClr>
+            </a:gs>
+            <a:gs pos="100000">
+              <a:schemeClr val="phClr">
+                <a:lumMod val="105000"/>
+                <a:satMod val="109000"/>
+                <a:tint val="81000"/>
+              </a:schemeClr>
+            </a:gs>
+          </a:gsLst>
+          <a:lin ang="5400000" scaled="0"/>
+        </a:gradFill>
+        <a:gradFill rotWithShape="1">
+          <a:gsLst>
+            <a:gs pos="0">
+              <a:schemeClr val="phClr">
+                <a:satMod val="103000"/>
+                <a:lumMod val="102000"/>
+                <a:tint val="94000"/>
+              </a:schemeClr>
+            </a:gs>
+            <a:gs pos="50000">
+              <a:schemeClr val="phClr">
+                <a:satMod val="110000"/>
+                <a:lumMod val="100000"/>
+                <a:shade val="100000"/>
+              </a:schemeClr>
+            </a:gs>
+            <a:gs pos="100000">
+              <a:schemeClr val="phClr">
+                <a:lumMod val="99000"/>
+                <a:satMod val="120000"/>
+                <a:shade val="78000"/>
+              </a:schemeClr>
+            </a:gs>
+          </a:gsLst>
+          <a:lin ang="5400000" scaled="0"/>
+        </a:gradFill>
+      </a:fillStyleLst>
+      <a:lnStyleLst>
+        <a:ln w="6350" cap="flat" cmpd="sng" algn="ctr">
+          <a:solidFill>
+            <a:schemeClr val="phClr"/>
+          </a:solidFill>
+          <a:prstDash val="solid"/>
+          <a:miter lim="800000"/>
+        </a:ln>
+        <a:ln w="12700" cap="flat" cmpd="sng" algn="ctr">
+          <a:solidFill>
+            <a:schemeClr val="phClr"/>
+          </a:solidFill>
+          <a:prstDash val="solid"/>
+          <a:miter lim="800000"/>
+        </a:ln>
+        <a:ln w="19050" cap="flat" cmpd="sng" algn="ctr">
+          <a:solidFill>
+            <a:schemeClr val="phClr"/>
+          </a:solidFill>
+          <a:prstDash val="solid"/>
+          <a:miter lim="800000"/>
+        </a:ln>
+      </a:lnStyleLst>
+      <a:effectStyleLst>
+        <a:effectStyle>
+          <a:effectLst/>
+        </a:effectStyle>
+        <a:effectStyle>
+          <a:effectLst/>
+        </a:effectStyle>
+        <a:effectStyle>
+          <a:effectLst>
+            <a:outerShdw blurRad="57150" dist="19050" dir="5400000" algn="ctr" rotWithShape="0">
+              <a:srgbClr val="000000">
+                <a:alpha val="63000"/>
+              </a:srgbClr>
+            </a:outerShdw>
+          </a:effectLst>
+        </a:effectStyle>
+      </a:effectStyleLst>
+      <a:bgFillStyleLst>
+        <a:solidFill>
+          <a:schemeClr val="phClr"/>
+        </a:solidFill>
+        <a:solidFill>
+          <a:schemeClr val="phClr">
+            <a:tint val="95000"/>
+            <a:satMod val="170000"/>
+          </a:schemeClr>
+        </a:solidFill>
+        <a:gradFill rotWithShape="1">
+          <a:gsLst>
+            <a:gs pos="0">
+              <a:schemeClr val="phClr">
+                <a:tint val="93000"/>
+                <a:satMod val="150000"/>
+                <a:shade val="98000"/>
+                <a:lumMod val="102000"/>
+              </a:schemeClr>
+            </a:gs>
+            <a:gs pos="50000">
+              <a:schemeClr val="phClr">
+                <a:tint val="98000"/>
+                <a:satMod val="130000"/>
+                <a:shade val="90000"/>
+                <a:lumMod val="103000"/>
+              </a:schemeClr>
+            </a:gs>
+            <a:gs pos="100000">
+              <a:schemeClr val="phClr">
+                <a:shade val="63000"/>
+                <a:satMod val="120000"/>
+              </a:schemeClr>
+            </a:gs>
+          </a:gsLst>
+          <a:lin ang="5400000" scaled="0"/>
+        </a:gradFill>
+      </a:bgFillStyleLst>
+    </a:fmtScheme>
+  </a:themeElements>
+  <a:objectDefaults/>
+  <a:extraClrSchemeLst/>
+  <a:extLst>
+    <a:ext uri="{05A4C25C-085E-4340-85A3-A5531E510DB2}">
+      <thm15:themeFamily xmlns:thm15="http://schemas.microsoft.com/office/thememl/2012/main" name="Office Theme" id="{62F939B6-93AF-4DB8-9C6B-D6C7DFDC589F}" vid="{4A3C46E8-61CC-4603-A589-7422A47A8E4A}"/>
+    </a:ext>
+  </a:extLst>
+</a:theme>
 </file>
</xml_diff>